<commit_message>
small changes on poster (from meeting)
</commit_message>
<xml_diff>
--- a/_DOCUMENTATION/05_Poster/kort-Poster.pptx
+++ b/_DOCUMENTATION/05_Poster/kort-Poster.pptx
@@ -5483,7 +5483,7 @@
         </p:blipFill>
         <p:spPr bwMode="auto">
           <a:xfrm>
-            <a:off x="38832506" y="25852486"/>
+            <a:off x="38832506" y="25924496"/>
             <a:ext cx="2393321" cy="2393321"/>
           </a:xfrm>
           <a:prstGeom prst="rect">
@@ -5503,7 +5503,7 @@
       </p:pic>
       <p:pic>
         <p:nvPicPr>
-          <p:cNvPr id="1033" name="Picture 9" descr="D:\xampp\htdocs\kort\_DOCUMENTATION\02_Documentation\images\screenshots\kort-screenshot-validation.png"/>
+          <p:cNvPr id="1034" name="Picture 10" descr="D:\xampp\htdocs\kort\_DOCUMENTATION\02_Documentation\images\screenshots\kort-screenshot-vote.png"/>
           <p:cNvPicPr>
             <a:picLocks noChangeAspect="1" noChangeArrowheads="1"/>
           </p:cNvPicPr>
@@ -5524,8 +5524,8 @@
         </p:blipFill>
         <p:spPr bwMode="auto">
           <a:xfrm>
-            <a:off x="30262084" y="13377459"/>
-            <a:ext cx="2509408" cy="5039191"/>
+            <a:off x="33185315" y="13361388"/>
+            <a:ext cx="2517411" cy="5055262"/>
           </a:xfrm>
           <a:prstGeom prst="rect">
             <a:avLst/>
@@ -5544,7 +5544,7 @@
       </p:pic>
       <p:pic>
         <p:nvPicPr>
-          <p:cNvPr id="1034" name="Picture 10" descr="D:\xampp\htdocs\kort\_DOCUMENTATION\02_Documentation\images\screenshots\kort-screenshot-vote.png"/>
+          <p:cNvPr id="1036" name="Picture 12" descr="D:\xampp\htdocs\kort\_DOCUMENTATION\02_Documentation\images\screenshots\kort-screenshot-highscore.png"/>
           <p:cNvPicPr>
             <a:picLocks noChangeAspect="1" noChangeArrowheads="1"/>
           </p:cNvPicPr>
@@ -5565,8 +5565,8 @@
         </p:blipFill>
         <p:spPr bwMode="auto">
           <a:xfrm>
-            <a:off x="33071675" y="13361388"/>
-            <a:ext cx="2517411" cy="5055262"/>
+            <a:off x="36094302" y="13361388"/>
+            <a:ext cx="2515813" cy="5039191"/>
           </a:xfrm>
           <a:prstGeom prst="rect">
             <a:avLst/>
@@ -5585,7 +5585,7 @@
       </p:pic>
       <p:pic>
         <p:nvPicPr>
-          <p:cNvPr id="1036" name="Picture 12" descr="D:\xampp\htdocs\kort\_DOCUMENTATION\02_Documentation\images\screenshots\kort-screenshot-highscore.png"/>
+          <p:cNvPr id="1037" name="Picture 13" descr="D:\xampp\htdocs\kort\_DOCUMENTATION\02_Documentation\images\screenshots\kort-screenshot-profile.png"/>
           <p:cNvPicPr>
             <a:picLocks noChangeAspect="1" noChangeArrowheads="1"/>
           </p:cNvPicPr>
@@ -5606,48 +5606,7 @@
         </p:blipFill>
         <p:spPr bwMode="auto">
           <a:xfrm>
-            <a:off x="38297311" y="13377459"/>
-            <a:ext cx="2515813" cy="5039191"/>
-          </a:xfrm>
-          <a:prstGeom prst="rect">
-            <a:avLst/>
-          </a:prstGeom>
-          <a:noFill/>
-          <a:extLst>
-            <a:ext uri="{909E8E84-426E-40DD-AFC4-6F175D3DCCD1}">
-              <a14:hiddenFill xmlns:a14="http://schemas.microsoft.com/office/drawing/2010/main">
-                <a:solidFill>
-                  <a:srgbClr val="FFFFFF"/>
-                </a:solidFill>
-              </a14:hiddenFill>
-            </a:ext>
-          </a:extLst>
-        </p:spPr>
-      </p:pic>
-      <p:pic>
-        <p:nvPicPr>
-          <p:cNvPr id="1037" name="Picture 13" descr="D:\xampp\htdocs\kort\_DOCUMENTATION\02_Documentation\images\screenshots\kort-screenshot-profile.png"/>
-          <p:cNvPicPr>
-            <a:picLocks noChangeAspect="1" noChangeArrowheads="1"/>
-          </p:cNvPicPr>
-          <p:nvPr/>
-        </p:nvPicPr>
-        <p:blipFill>
-          <a:blip r:embed="rId12">
-            <a:extLst>
-              <a:ext uri="{28A0092B-C50C-407E-A947-70E740481C1C}">
-                <a14:useLocalDpi xmlns:a14="http://schemas.microsoft.com/office/drawing/2010/main" val="0"/>
-              </a:ext>
-            </a:extLst>
-          </a:blip>
-          <a:srcRect/>
-          <a:stretch>
-            <a:fillRect/>
-          </a:stretch>
-        </p:blipFill>
-        <p:spPr bwMode="auto">
-          <a:xfrm>
-            <a:off x="35694464" y="13377459"/>
+            <a:off x="38953487" y="13377459"/>
             <a:ext cx="2490180" cy="5039191"/>
           </a:xfrm>
           <a:prstGeom prst="rect">
@@ -5673,7 +5632,7 @@
         </p:nvSpPr>
         <p:spPr>
           <a:xfrm>
-            <a:off x="38546320" y="18566862"/>
+            <a:off x="36343311" y="18581212"/>
             <a:ext cx="2017794" cy="461665"/>
           </a:xfrm>
           <a:prstGeom prst="rect">
@@ -5704,8 +5663,8 @@
         </p:nvSpPr>
         <p:spPr>
           <a:xfrm>
-            <a:off x="35205365" y="18566862"/>
-            <a:ext cx="3468378" cy="461665"/>
+            <a:off x="39478477" y="18581212"/>
+            <a:ext cx="1440200" cy="461665"/>
           </a:xfrm>
           <a:prstGeom prst="rect">
             <a:avLst/>
@@ -5929,14 +5888,14 @@
           <p:nvPr>
             <p:extLst>
               <p:ext uri="{D42A27DB-BD31-4B8C-83A1-F6EECF244321}">
-                <p14:modId xmlns:p14="http://schemas.microsoft.com/office/powerpoint/2010/main" val="2457238206"/>
+                <p14:modId xmlns:p14="http://schemas.microsoft.com/office/powerpoint/2010/main" val="2428863907"/>
               </p:ext>
             </p:extLst>
           </p:nvPr>
         </p:nvGraphicFramePr>
         <p:xfrm>
-          <a:off x="1529502" y="11702279"/>
-          <a:ext cx="13897930" cy="5749200"/>
+          <a:off x="1529502" y="11606337"/>
+          <a:ext cx="13897930" cy="6054000"/>
         </p:xfrm>
         <a:graphic>
           <a:graphicData uri="http://schemas.openxmlformats.org/drawingml/2006/table">
@@ -6009,13 +5968,7 @@
                         <a:rPr lang="de-CH" sz="4000" baseline="0" dirty="0" smtClean="0">
                           <a:latin typeface="Calibri" pitchFamily="34" charset="0"/>
                         </a:rPr>
-                        <a:t> Touch Framework </a:t>
-                      </a:r>
-                      <a:r>
-                        <a:rPr lang="de-CH" sz="4000" baseline="0" dirty="0" smtClean="0">
-                          <a:latin typeface="Calibri" pitchFamily="34" charset="0"/>
-                        </a:rPr>
-                        <a:t>verwendet</a:t>
+                        <a:t> Touch Framework verwendet</a:t>
                       </a:r>
                     </a:p>
                     <a:p>
@@ -6057,7 +6010,7 @@
                         <a:buChar char="§"/>
                       </a:pPr>
                       <a:r>
-                        <a:rPr lang="de-CH" sz="3000" baseline="0" dirty="0" smtClean="0">
+                        <a:rPr lang="de-CH" sz="4000" baseline="0" dirty="0" smtClean="0">
                           <a:latin typeface="Calibri" pitchFamily="34" charset="0"/>
                         </a:rPr>
                         <a:t>Frontend: HTML5, CSS, JavaScript</a:t>
@@ -6072,7 +6025,7 @@
                         <a:buChar char="§"/>
                       </a:pPr>
                       <a:r>
-                        <a:rPr lang="de-CH" sz="3000" baseline="0" dirty="0" smtClean="0">
+                        <a:rPr lang="de-CH" sz="4000" baseline="0" dirty="0" smtClean="0">
                           <a:latin typeface="Calibri" pitchFamily="34" charset="0"/>
                         </a:rPr>
                         <a:t>Backend: PHP, Shell</a:t>
@@ -6094,7 +6047,7 @@
         </p:nvSpPr>
         <p:spPr>
           <a:xfrm rot="10800000" flipH="1">
-            <a:off x="35534455" y="26026257"/>
+            <a:off x="35534455" y="25941487"/>
             <a:ext cx="3171023" cy="1677581"/>
           </a:xfrm>
           <a:prstGeom prst="bentArrow">
@@ -6137,14 +6090,14 @@
           <p:nvPr>
             <p:extLst>
               <p:ext uri="{D42A27DB-BD31-4B8C-83A1-F6EECF244321}">
-                <p14:modId xmlns:p14="http://schemas.microsoft.com/office/powerpoint/2010/main" val="2421724750"/>
+                <p14:modId xmlns:p14="http://schemas.microsoft.com/office/powerpoint/2010/main" val="4157032882"/>
               </p:ext>
             </p:extLst>
           </p:nvPr>
         </p:nvGraphicFramePr>
         <p:xfrm>
           <a:off x="27368007" y="6582397"/>
-          <a:ext cx="13953622" cy="5444400"/>
+          <a:ext cx="13953622" cy="6054000"/>
         </p:xfrm>
         <a:graphic>
           <a:graphicData uri="http://schemas.openxmlformats.org/drawingml/2006/table">
@@ -6183,17 +6136,6 @@
                         </a:rPr>
                         <a:t>Ergebnisse</a:t>
                       </a:r>
-                      <a:endParaRPr lang="de-CH" sz="5000" dirty="0" smtClean="0">
-                        <a:effectLst>
-                          <a:outerShdw blurRad="50800" dist="38100" dir="2700000" algn="tl" rotWithShape="0">
-                            <a:prstClr val="black">
-                              <a:alpha val="40000"/>
-                            </a:prstClr>
-                          </a:outerShdw>
-                        </a:effectLst>
-                        <a:latin typeface="Calibri" pitchFamily="34" charset="0"/>
-                        <a:cs typeface="Calibri" pitchFamily="34" charset="0"/>
-                      </a:endParaRPr>
                     </a:p>
                   </a:txBody>
                   <a:tcPr marL="360000" marR="360000" marT="180000" marB="180000">
@@ -6225,6 +6167,12 @@
                         <a:t>Login mit </a:t>
                       </a:r>
                       <a:r>
+                        <a:rPr lang="de-CH" sz="4000" dirty="0" smtClean="0">
+                          <a:latin typeface="Calibri" pitchFamily="34" charset="0"/>
+                        </a:rPr>
+                        <a:t>Google </a:t>
+                      </a:r>
+                      <a:r>
                         <a:rPr lang="de-CH" sz="4000" dirty="0" err="1" smtClean="0">
                           <a:latin typeface="Calibri" pitchFamily="34" charset="0"/>
                         </a:rPr>
@@ -6246,7 +6194,37 @@
                         <a:rPr lang="de-CH" sz="4000" dirty="0" smtClean="0">
                           <a:latin typeface="Calibri" pitchFamily="34" charset="0"/>
                         </a:rPr>
-                        <a:t>Fehler verbessern</a:t>
+                        <a:t>Fehler </a:t>
+                      </a:r>
+                      <a:r>
+                        <a:rPr lang="de-CH" sz="4000" dirty="0" smtClean="0">
+                          <a:latin typeface="Calibri" pitchFamily="34" charset="0"/>
+                        </a:rPr>
+                        <a:t>auf Karte anzeigen und verbessern</a:t>
+                      </a:r>
+                      <a:endParaRPr lang="de-CH" sz="4000" dirty="0" smtClean="0">
+                        <a:latin typeface="Calibri" pitchFamily="34" charset="0"/>
+                      </a:endParaRPr>
+                    </a:p>
+                    <a:p>
+                      <a:pPr marL="571500" indent="-571500">
+                        <a:spcAft>
+                          <a:spcPts val="1800"/>
+                        </a:spcAft>
+                        <a:buFont typeface="Wingdings" pitchFamily="2" charset="2"/>
+                        <a:buChar char="§"/>
+                      </a:pPr>
+                      <a:r>
+                        <a:rPr lang="de-CH" sz="4000" baseline="0" dirty="0" smtClean="0">
+                          <a:latin typeface="Calibri" pitchFamily="34" charset="0"/>
+                        </a:rPr>
+                        <a:t>Eingetragene Lösungen </a:t>
+                      </a:r>
+                      <a:r>
+                        <a:rPr lang="de-CH" sz="4000" baseline="0" dirty="0" smtClean="0">
+                          <a:latin typeface="Calibri" pitchFamily="34" charset="0"/>
+                        </a:rPr>
+                        <a:t>überprüfen</a:t>
                       </a:r>
                     </a:p>
                     <a:p>
@@ -6261,22 +6239,19 @@
                         <a:rPr lang="de-CH" sz="4000" baseline="0" dirty="0" smtClean="0">
                           <a:latin typeface="Calibri" pitchFamily="34" charset="0"/>
                         </a:rPr>
-                        <a:t>Lösungen überprüfen</a:t>
+                        <a:t>Globale </a:t>
                       </a:r>
-                    </a:p>
-                    <a:p>
-                      <a:pPr marL="571500" indent="-571500">
-                        <a:spcAft>
-                          <a:spcPts val="1800"/>
-                        </a:spcAft>
-                        <a:buFont typeface="Wingdings" pitchFamily="2" charset="2"/>
-                        <a:buChar char="§"/>
-                      </a:pPr>
                       <a:r>
                         <a:rPr lang="de-CH" sz="4000" baseline="0" dirty="0" err="1" smtClean="0">
                           <a:latin typeface="Calibri" pitchFamily="34" charset="0"/>
                         </a:rPr>
                         <a:t>Highscore</a:t>
+                      </a:r>
+                      <a:r>
+                        <a:rPr lang="de-CH" sz="4000" baseline="0" dirty="0" smtClean="0">
+                          <a:latin typeface="Calibri" pitchFamily="34" charset="0"/>
+                        </a:rPr>
+                        <a:t> für den Vergleich mit anderen Spielern</a:t>
                       </a:r>
                       <a:endParaRPr lang="de-CH" sz="4000" baseline="0" dirty="0" smtClean="0">
                         <a:latin typeface="Calibri" pitchFamily="34" charset="0"/>
@@ -6294,7 +6269,7 @@
                         <a:rPr lang="de-CH" sz="4000" baseline="0" dirty="0" smtClean="0">
                           <a:latin typeface="Calibri" pitchFamily="34" charset="0"/>
                         </a:rPr>
-                        <a:t>Profil</a:t>
+                        <a:t>Ansicht seines eigenen Profils (Gewonnene Punkte / Auszeichnungen)</a:t>
                       </a:r>
                       <a:endParaRPr lang="de-CH" sz="3000" baseline="0" dirty="0" smtClean="0">
                         <a:latin typeface="Calibri" pitchFamily="34" charset="0"/>
@@ -6317,14 +6292,14 @@
           <p:nvPr>
             <p:extLst>
               <p:ext uri="{D42A27DB-BD31-4B8C-83A1-F6EECF244321}">
-                <p14:modId xmlns:p14="http://schemas.microsoft.com/office/powerpoint/2010/main" val="2395949878"/>
+                <p14:modId xmlns:p14="http://schemas.microsoft.com/office/powerpoint/2010/main" val="1937064408"/>
               </p:ext>
             </p:extLst>
           </p:nvPr>
         </p:nvGraphicFramePr>
         <p:xfrm>
           <a:off x="1530350" y="18678227"/>
-          <a:ext cx="13897083" cy="9711600"/>
+          <a:ext cx="13897083" cy="10016400"/>
         </p:xfrm>
         <a:graphic>
           <a:graphicData uri="http://schemas.openxmlformats.org/drawingml/2006/table">
@@ -6350,6 +6325,20 @@
                     <a:p>
                       <a:pPr algn="just"/>
                       <a:r>
+                        <a:rPr lang="de-CH" sz="5000" dirty="0" smtClean="0">
+                          <a:effectLst>
+                            <a:outerShdw blurRad="50800" dist="38100" dir="2700000" algn="tl" rotWithShape="0">
+                              <a:prstClr val="black">
+                                <a:alpha val="40000"/>
+                              </a:prstClr>
+                            </a:outerShdw>
+                          </a:effectLst>
+                          <a:latin typeface="Calibri" pitchFamily="34" charset="0"/>
+                          <a:cs typeface="Calibri" pitchFamily="34" charset="0"/>
+                        </a:rPr>
+                        <a:t>Was ist </a:t>
+                      </a:r>
+                      <a:r>
                         <a:rPr lang="de-CH" sz="5000" dirty="0" err="1" smtClean="0">
                           <a:effectLst>
                             <a:outerShdw blurRad="50800" dist="38100" dir="2700000" algn="tl" rotWithShape="0">
@@ -6362,6 +6351,20 @@
                           <a:cs typeface="Calibri" pitchFamily="34" charset="0"/>
                         </a:rPr>
                         <a:t>Gamification</a:t>
+                      </a:r>
+                      <a:r>
+                        <a:rPr lang="de-CH" sz="5000" dirty="0" smtClean="0">
+                          <a:effectLst>
+                            <a:outerShdw blurRad="50800" dist="38100" dir="2700000" algn="tl" rotWithShape="0">
+                              <a:prstClr val="black">
+                                <a:alpha val="40000"/>
+                              </a:prstClr>
+                            </a:outerShdw>
+                          </a:effectLst>
+                          <a:latin typeface="Calibri" pitchFamily="34" charset="0"/>
+                          <a:cs typeface="Calibri" pitchFamily="34" charset="0"/>
+                        </a:rPr>
+                        <a:t>?</a:t>
                       </a:r>
                       <a:endParaRPr lang="de-CH" sz="5000" dirty="0" smtClean="0">
                         <a:effectLst>
@@ -6513,7 +6516,7 @@
                         <a:buChar char="§"/>
                       </a:pPr>
                       <a:r>
-                        <a:rPr lang="de-CH" sz="3000" baseline="0" dirty="0" smtClean="0">
+                        <a:rPr lang="de-CH" sz="4000" baseline="0" dirty="0" smtClean="0">
                           <a:latin typeface="Calibri" pitchFamily="34" charset="0"/>
                         </a:rPr>
                         <a:t>Spezialauszeichnungen</a:t>
@@ -6528,7 +6531,7 @@
                         <a:buChar char="§"/>
                       </a:pPr>
                       <a:r>
-                        <a:rPr lang="de-CH" sz="3000" baseline="0" dirty="0" smtClean="0">
+                        <a:rPr lang="de-CH" sz="4000" baseline="0" dirty="0" smtClean="0">
                           <a:latin typeface="Calibri" pitchFamily="34" charset="0"/>
                         </a:rPr>
                         <a:t>Abhängig von Ereignissen (z.B. Halloween, Advent)</a:t>
@@ -6566,7 +6569,7 @@
           <p:nvPr/>
         </p:nvPicPr>
         <p:blipFill>
-          <a:blip r:embed="rId13">
+          <a:blip r:embed="rId12">
             <a:extLst>
               <a:ext uri="{28A0092B-C50C-407E-A947-70E740481C1C}">
                 <a14:useLocalDpi xmlns:a14="http://schemas.microsoft.com/office/drawing/2010/main" val="0"/>
@@ -6607,7 +6610,7 @@
           <p:nvPr/>
         </p:nvPicPr>
         <p:blipFill rotWithShape="1">
-          <a:blip r:embed="rId14">
+          <a:blip r:embed="rId13">
             <a:extLst>
               <a:ext uri="{28A0092B-C50C-407E-A947-70E740481C1C}">
                 <a14:useLocalDpi xmlns:a14="http://schemas.microsoft.com/office/drawing/2010/main" val="0"/>
@@ -6646,7 +6649,7 @@
           <p:nvPr/>
         </p:nvPicPr>
         <p:blipFill>
-          <a:blip r:embed="rId15">
+          <a:blip r:embed="rId14">
             <a:extLst>
               <a:ext uri="{28A0092B-C50C-407E-A947-70E740481C1C}">
                 <a14:useLocalDpi xmlns:a14="http://schemas.microsoft.com/office/drawing/2010/main" val="0"/>
@@ -6660,7 +6663,7 @@
         </p:blipFill>
         <p:spPr bwMode="auto">
           <a:xfrm>
-            <a:off x="13934080" y="11467477"/>
+            <a:off x="13934080" y="11371535"/>
             <a:ext cx="1853402" cy="1732001"/>
           </a:xfrm>
           <a:prstGeom prst="rect">
@@ -6687,7 +6690,7 @@
           <p:nvPr/>
         </p:nvPicPr>
         <p:blipFill>
-          <a:blip r:embed="rId16">
+          <a:blip r:embed="rId15">
             <a:extLst>
               <a:ext uri="{28A0092B-C50C-407E-A947-70E740481C1C}">
                 <a14:useLocalDpi xmlns:a14="http://schemas.microsoft.com/office/drawing/2010/main" val="0"/>
@@ -6751,7 +6754,7 @@
           <p:nvPr/>
         </p:nvPicPr>
         <p:blipFill>
-          <a:blip r:embed="rId17">
+          <a:blip r:embed="rId16">
             <a:extLst>
               <a:ext uri="{28A0092B-C50C-407E-A947-70E740481C1C}">
                 <a14:useLocalDpi xmlns:a14="http://schemas.microsoft.com/office/drawing/2010/main" val="0"/>
@@ -6815,7 +6818,7 @@
           <p:nvPr/>
         </p:nvPicPr>
         <p:blipFill>
-          <a:blip r:embed="rId18">
+          <a:blip r:embed="rId17">
             <a:extLst>
               <a:ext uri="{28A0092B-C50C-407E-A947-70E740481C1C}">
                 <a14:useLocalDpi xmlns:a14="http://schemas.microsoft.com/office/drawing/2010/main" val="0"/>
@@ -6879,7 +6882,7 @@
           <p:nvPr/>
         </p:nvPicPr>
         <p:blipFill>
-          <a:blip r:embed="rId19">
+          <a:blip r:embed="rId18">
             <a:extLst>
               <a:ext uri="{28A0092B-C50C-407E-A947-70E740481C1C}">
                 <a14:useLocalDpi xmlns:a14="http://schemas.microsoft.com/office/drawing/2010/main" val="0"/>
@@ -6943,7 +6946,7 @@
           <p:nvPr/>
         </p:nvPicPr>
         <p:blipFill>
-          <a:blip r:embed="rId20" cstate="print">
+          <a:blip r:embed="rId19" cstate="print">
             <a:extLst>
               <a:ext uri="{28A0092B-C50C-407E-A947-70E740481C1C}">
                 <a14:useLocalDpi xmlns:a14="http://schemas.microsoft.com/office/drawing/2010/main" val="0"/>
@@ -6984,7 +6987,7 @@
           <p:nvPr/>
         </p:nvPicPr>
         <p:blipFill>
-          <a:blip r:embed="rId21">
+          <a:blip r:embed="rId20">
             <a:extLst>
               <a:ext uri="{28A0092B-C50C-407E-A947-70E740481C1C}">
                 <a14:useLocalDpi xmlns:a14="http://schemas.microsoft.com/office/drawing/2010/main" val="0"/>
@@ -7193,8 +7196,8 @@
         </p:nvSpPr>
         <p:spPr>
           <a:xfrm>
-            <a:off x="31164613" y="18566862"/>
-            <a:ext cx="3468378" cy="461665"/>
+            <a:off x="33576926" y="18581212"/>
+            <a:ext cx="1734188" cy="461665"/>
           </a:xfrm>
           <a:prstGeom prst="rect">
             <a:avLst/>
@@ -7219,6 +7222,47 @@
       <p:pic>
         <p:nvPicPr>
           <p:cNvPr id="1039" name="Picture 15" descr="D:\xampp\htdocs\kort\_DOCUMENTATION\05_Poster\images\kort-big_picture.png"/>
+          <p:cNvPicPr>
+            <a:picLocks noChangeAspect="1" noChangeArrowheads="1"/>
+          </p:cNvPicPr>
+          <p:nvPr/>
+        </p:nvPicPr>
+        <p:blipFill>
+          <a:blip r:embed="rId21">
+            <a:extLst>
+              <a:ext uri="{28A0092B-C50C-407E-A947-70E740481C1C}">
+                <a14:useLocalDpi xmlns:a14="http://schemas.microsoft.com/office/drawing/2010/main" val="0"/>
+              </a:ext>
+            </a:extLst>
+          </a:blip>
+          <a:srcRect/>
+          <a:stretch>
+            <a:fillRect/>
+          </a:stretch>
+        </p:blipFill>
+        <p:spPr bwMode="auto">
+          <a:xfrm>
+            <a:off x="16478021" y="13739110"/>
+            <a:ext cx="12775331" cy="14650717"/>
+          </a:xfrm>
+          <a:prstGeom prst="rect">
+            <a:avLst/>
+          </a:prstGeom>
+          <a:noFill/>
+          <a:extLst>
+            <a:ext uri="{909E8E84-426E-40DD-AFC4-6F175D3DCCD1}">
+              <a14:hiddenFill xmlns:a14="http://schemas.microsoft.com/office/drawing/2010/main">
+                <a:solidFill>
+                  <a:srgbClr val="FFFFFF"/>
+                </a:solidFill>
+              </a14:hiddenFill>
+            </a:ext>
+          </a:extLst>
+        </p:spPr>
+      </p:pic>
+      <p:pic>
+        <p:nvPicPr>
+          <p:cNvPr id="1047" name="Picture 23" descr="http://suvendugiri.files.wordpress.com/2012/02/checkbox.png?w=604"/>
           <p:cNvPicPr>
             <a:picLocks noChangeAspect="1" noChangeArrowheads="1"/>
           </p:cNvPicPr>
@@ -7239,8 +7283,8 @@
         </p:blipFill>
         <p:spPr bwMode="auto">
           <a:xfrm>
-            <a:off x="16478021" y="13595090"/>
-            <a:ext cx="12775331" cy="14650717"/>
+            <a:off x="39406762" y="6138146"/>
+            <a:ext cx="2016871" cy="2016871"/>
           </a:xfrm>
           <a:prstGeom prst="rect">
             <a:avLst/>
@@ -7257,9 +7301,74 @@
           </a:extLst>
         </p:spPr>
       </p:pic>
+      <p:sp>
+        <p:nvSpPr>
+          <p:cNvPr id="2" name="Textfeld 1"/>
+          <p:cNvSpPr txBox="1"/>
+          <p:nvPr/>
+        </p:nvSpPr>
+        <p:spPr>
+          <a:xfrm>
+            <a:off x="29685412" y="19748627"/>
+            <a:ext cx="5066063" cy="707886"/>
+          </a:xfrm>
+          <a:prstGeom prst="rect">
+            <a:avLst/>
+          </a:prstGeom>
+          <a:noFill/>
+        </p:spPr>
+        <p:txBody>
+          <a:bodyPr wrap="square" rtlCol="0">
+            <a:spAutoFit/>
+          </a:bodyPr>
+          <a:lstStyle/>
+          <a:p>
+            <a:r>
+              <a:rPr lang="de-CH" sz="4000" b="1" dirty="0" smtClean="0">
+                <a:latin typeface="Calibri" pitchFamily="34" charset="0"/>
+              </a:rPr>
+              <a:t>Unterstützte Browser:</a:t>
+            </a:r>
+            <a:endParaRPr lang="de-CH" sz="4000" b="1" dirty="0">
+              <a:latin typeface="Calibri" pitchFamily="34" charset="0"/>
+            </a:endParaRPr>
+          </a:p>
+        </p:txBody>
+      </p:sp>
+      <p:sp>
+        <p:nvSpPr>
+          <p:cNvPr id="42" name="Textfeld 41"/>
+          <p:cNvSpPr txBox="1"/>
+          <p:nvPr/>
+        </p:nvSpPr>
+        <p:spPr>
+          <a:xfrm>
+            <a:off x="30597722" y="18581211"/>
+            <a:ext cx="1734189" cy="461665"/>
+          </a:xfrm>
+          <a:prstGeom prst="rect">
+            <a:avLst/>
+          </a:prstGeom>
+          <a:noFill/>
+        </p:spPr>
+        <p:txBody>
+          <a:bodyPr wrap="square" rtlCol="0">
+            <a:spAutoFit/>
+          </a:bodyPr>
+          <a:lstStyle/>
+          <a:p>
+            <a:pPr algn="ctr"/>
+            <a:r>
+              <a:rPr lang="de-CH" sz="2400" i="1" dirty="0" smtClean="0"/>
+              <a:t>Aufträge</a:t>
+            </a:r>
+            <a:endParaRPr lang="de-CH" sz="2400" i="1" dirty="0"/>
+          </a:p>
+        </p:txBody>
+      </p:sp>
       <p:pic>
         <p:nvPicPr>
-          <p:cNvPr id="1047" name="Picture 23" descr="http://suvendugiri.files.wordpress.com/2012/02/checkbox.png?w=604"/>
+          <p:cNvPr id="1026" name="Picture 2" descr="D:\xampp\htdocs\kort\_DOCUMENTATION\02_Documentation\images\screenshots\kort-screenshot-bugmap.png"/>
           <p:cNvPicPr>
             <a:picLocks noChangeAspect="1" noChangeArrowheads="1"/>
           </p:cNvPicPr>
@@ -7280,8 +7389,8 @@
         </p:blipFill>
         <p:spPr bwMode="auto">
           <a:xfrm>
-            <a:off x="39406762" y="6138146"/>
-            <a:ext cx="2016871" cy="2016871"/>
+            <a:off x="30219803" y="13361388"/>
+            <a:ext cx="2490029" cy="5039191"/>
           </a:xfrm>
           <a:prstGeom prst="rect">
             <a:avLst/>

</xml_diff>

<commit_message>
small changes, color of gamification box
</commit_message>
<xml_diff>
--- a/_DOCUMENTATION/05_Poster/kort-Poster.pptx
+++ b/_DOCUMENTATION/05_Poster/kort-Poster.pptx
@@ -5524,7 +5524,7 @@
         </p:blipFill>
         <p:spPr bwMode="auto">
           <a:xfrm>
-            <a:off x="33185315" y="13361388"/>
+            <a:off x="33185315" y="13779098"/>
             <a:ext cx="2517411" cy="5055262"/>
           </a:xfrm>
           <a:prstGeom prst="rect">
@@ -5565,7 +5565,7 @@
         </p:blipFill>
         <p:spPr bwMode="auto">
           <a:xfrm>
-            <a:off x="36094302" y="13361388"/>
+            <a:off x="36094302" y="13779098"/>
             <a:ext cx="2515813" cy="5039191"/>
           </a:xfrm>
           <a:prstGeom prst="rect">
@@ -5606,7 +5606,7 @@
         </p:blipFill>
         <p:spPr bwMode="auto">
           <a:xfrm>
-            <a:off x="38953487" y="13377459"/>
+            <a:off x="38953487" y="13795169"/>
             <a:ext cx="2490180" cy="5039191"/>
           </a:xfrm>
           <a:prstGeom prst="rect">
@@ -5632,7 +5632,7 @@
         </p:nvSpPr>
         <p:spPr>
           <a:xfrm>
-            <a:off x="36343311" y="18581212"/>
+            <a:off x="36343311" y="18998922"/>
             <a:ext cx="2017794" cy="461665"/>
           </a:xfrm>
           <a:prstGeom prst="rect">
@@ -5663,7 +5663,7 @@
         </p:nvSpPr>
         <p:spPr>
           <a:xfrm>
-            <a:off x="39478477" y="18581212"/>
+            <a:off x="39478477" y="18998922"/>
             <a:ext cx="1440200" cy="461665"/>
           </a:xfrm>
           <a:prstGeom prst="rect">
@@ -5695,7 +5695,7 @@
           <p:nvPr>
             <p:extLst>
               <p:ext uri="{D42A27DB-BD31-4B8C-83A1-F6EECF244321}">
-                <p14:modId xmlns:p14="http://schemas.microsoft.com/office/powerpoint/2010/main" val="1344600802"/>
+                <p14:modId xmlns:p14="http://schemas.microsoft.com/office/powerpoint/2010/main" val="176406939"/>
               </p:ext>
             </p:extLst>
           </p:nvPr>
@@ -5784,16 +5784,16 @@
                         <a:t> HTML5 </a:t>
                       </a:r>
                       <a:r>
-                        <a:rPr lang="de-CH" sz="4000" dirty="0" err="1" smtClean="0">
+                        <a:rPr lang="de-CH" sz="4000" dirty="0" smtClean="0">
                           <a:latin typeface="Calibri" pitchFamily="34" charset="0"/>
                         </a:rPr>
-                        <a:t>WebApp</a:t>
+                        <a:t>Web-App </a:t>
                       </a:r>
                       <a:r>
                         <a:rPr lang="de-CH" sz="4000" dirty="0" smtClean="0">
                           <a:latin typeface="Calibri" pitchFamily="34" charset="0"/>
                         </a:rPr>
-                        <a:t> mit JavaScript</a:t>
+                        <a:t>mit JavaScript</a:t>
                       </a:r>
                     </a:p>
                     <a:p>
@@ -5808,7 +5808,13 @@
                         <a:rPr lang="de-CH" sz="4000" dirty="0" smtClean="0">
                           <a:latin typeface="Calibri" pitchFamily="34" charset="0"/>
                         </a:rPr>
-                        <a:t>Verbesserung von </a:t>
+                        <a:t>Verbesserung </a:t>
+                      </a:r>
+                      <a:r>
+                        <a:rPr lang="de-CH" sz="4000" dirty="0" smtClean="0">
+                          <a:latin typeface="Calibri" pitchFamily="34" charset="0"/>
+                        </a:rPr>
+                        <a:t>der </a:t>
                       </a:r>
                       <a:r>
                         <a:rPr lang="de-CH" sz="4000" dirty="0" err="1" smtClean="0">
@@ -5888,13 +5894,13 @@
           <p:nvPr>
             <p:extLst>
               <p:ext uri="{D42A27DB-BD31-4B8C-83A1-F6EECF244321}">
-                <p14:modId xmlns:p14="http://schemas.microsoft.com/office/powerpoint/2010/main" val="2428863907"/>
+                <p14:modId xmlns:p14="http://schemas.microsoft.com/office/powerpoint/2010/main" val="899279922"/>
               </p:ext>
             </p:extLst>
           </p:nvPr>
         </p:nvGraphicFramePr>
         <p:xfrm>
-          <a:off x="1529502" y="11606337"/>
+          <a:off x="1529502" y="11462317"/>
           <a:ext cx="13897930" cy="6054000"/>
         </p:xfrm>
         <a:graphic>
@@ -5959,6 +5965,12 @@
                         <a:buChar char="§"/>
                       </a:pPr>
                       <a:r>
+                        <a:rPr lang="de-CH" sz="4000" dirty="0" smtClean="0">
+                          <a:latin typeface="Calibri" pitchFamily="34" charset="0"/>
+                        </a:rPr>
+                        <a:t>Web-App wurde mit dem </a:t>
+                      </a:r>
+                      <a:r>
                         <a:rPr lang="de-CH" sz="4000" dirty="0" err="1" smtClean="0">
                           <a:latin typeface="Calibri" pitchFamily="34" charset="0"/>
                         </a:rPr>
@@ -5968,8 +5980,11 @@
                         <a:rPr lang="de-CH" sz="4000" baseline="0" dirty="0" smtClean="0">
                           <a:latin typeface="Calibri" pitchFamily="34" charset="0"/>
                         </a:rPr>
-                        <a:t> Touch Framework verwendet</a:t>
+                        <a:t> Touch 2 Framework erstellt</a:t>
                       </a:r>
+                      <a:endParaRPr lang="de-CH" sz="4000" baseline="0" dirty="0" smtClean="0">
+                        <a:latin typeface="Calibri" pitchFamily="34" charset="0"/>
+                      </a:endParaRPr>
                     </a:p>
                     <a:p>
                       <a:pPr marL="571500" indent="-571500">
@@ -5983,8 +5998,17 @@
                         <a:rPr lang="de-CH" sz="4000" baseline="0" dirty="0" smtClean="0">
                           <a:latin typeface="Calibri" pitchFamily="34" charset="0"/>
                         </a:rPr>
-                        <a:t>REST-Schnittstellen für Kommunikation zwischen Komponenten</a:t>
+                        <a:t>REST-Schnittstellen für Kommunikation zwischen </a:t>
                       </a:r>
+                      <a:r>
+                        <a:rPr lang="de-CH" sz="4000" baseline="0" dirty="0" smtClean="0">
+                          <a:latin typeface="Calibri" pitchFamily="34" charset="0"/>
+                        </a:rPr>
+                        <a:t>den Komponenten</a:t>
+                      </a:r>
+                      <a:endParaRPr lang="de-CH" sz="4000" baseline="0" dirty="0" smtClean="0">
+                        <a:latin typeface="Calibri" pitchFamily="34" charset="0"/>
+                      </a:endParaRPr>
                     </a:p>
                     <a:p>
                       <a:pPr marL="571500" indent="-571500">
@@ -6090,14 +6114,14 @@
           <p:nvPr>
             <p:extLst>
               <p:ext uri="{D42A27DB-BD31-4B8C-83A1-F6EECF244321}">
-                <p14:modId xmlns:p14="http://schemas.microsoft.com/office/powerpoint/2010/main" val="4157032882"/>
+                <p14:modId xmlns:p14="http://schemas.microsoft.com/office/powerpoint/2010/main" val="3839307838"/>
               </p:ext>
             </p:extLst>
           </p:nvPr>
         </p:nvGraphicFramePr>
         <p:xfrm>
           <a:off x="27368007" y="6582397"/>
-          <a:ext cx="13953622" cy="6054000"/>
+          <a:ext cx="13953622" cy="6892200"/>
         </p:xfrm>
         <a:graphic>
           <a:graphicData uri="http://schemas.openxmlformats.org/drawingml/2006/table">
@@ -6164,13 +6188,67 @@
                         <a:rPr lang="de-CH" sz="4000" dirty="0" smtClean="0">
                           <a:latin typeface="Calibri" pitchFamily="34" charset="0"/>
                         </a:rPr>
-                        <a:t>Login mit </a:t>
+                        <a:t>Web-App</a:t>
+                      </a:r>
+                      <a:r>
+                        <a:rPr lang="de-CH" sz="4000" baseline="0" dirty="0" smtClean="0">
+                          <a:latin typeface="Calibri" pitchFamily="34" charset="0"/>
+                        </a:rPr>
+                        <a:t> kompatibel mit </a:t>
+                      </a:r>
+                      <a:r>
+                        <a:rPr lang="de-CH" sz="4000" baseline="0" dirty="0" err="1" smtClean="0">
+                          <a:latin typeface="Calibri" pitchFamily="34" charset="0"/>
+                        </a:rPr>
+                        <a:t>iOS</a:t>
+                      </a:r>
+                      <a:r>
+                        <a:rPr lang="de-CH" sz="4000" baseline="0" dirty="0" smtClean="0">
+                          <a:latin typeface="Calibri" pitchFamily="34" charset="0"/>
+                        </a:rPr>
+                        <a:t>, </a:t>
+                      </a:r>
+                      <a:r>
+                        <a:rPr lang="de-CH" sz="4000" baseline="0" dirty="0" err="1" smtClean="0">
+                          <a:latin typeface="Calibri" pitchFamily="34" charset="0"/>
+                        </a:rPr>
+                        <a:t>Andoid</a:t>
+                      </a:r>
+                      <a:r>
+                        <a:rPr lang="de-CH" sz="4000" baseline="0" dirty="0" smtClean="0">
+                          <a:latin typeface="Calibri" pitchFamily="34" charset="0"/>
+                        </a:rPr>
+                        <a:t> und </a:t>
+                      </a:r>
+                      <a:r>
+                        <a:rPr lang="de-CH" sz="4000" baseline="0" dirty="0" err="1" smtClean="0">
+                          <a:latin typeface="Calibri" pitchFamily="34" charset="0"/>
+                        </a:rPr>
+                        <a:t>BlackBerry</a:t>
+                      </a:r>
+                      <a:endParaRPr lang="de-CH" sz="4000" dirty="0" smtClean="0">
+                        <a:latin typeface="Calibri" pitchFamily="34" charset="0"/>
+                      </a:endParaRPr>
+                    </a:p>
+                    <a:p>
+                      <a:pPr marL="571500" indent="-571500">
+                        <a:spcAft>
+                          <a:spcPts val="1800"/>
+                        </a:spcAft>
+                        <a:buFont typeface="Wingdings" pitchFamily="2" charset="2"/>
+                        <a:buChar char="§"/>
+                      </a:pPr>
+                      <a:r>
+                        <a:rPr lang="de-CH" sz="4000" dirty="0" smtClean="0">
+                          <a:latin typeface="Calibri" pitchFamily="34" charset="0"/>
+                        </a:rPr>
+                        <a:t>Login </a:t>
                       </a:r>
                       <a:r>
                         <a:rPr lang="de-CH" sz="4000" dirty="0" smtClean="0">
                           <a:latin typeface="Calibri" pitchFamily="34" charset="0"/>
                         </a:rPr>
-                        <a:t>Google </a:t>
+                        <a:t>mit Google </a:t>
                       </a:r>
                       <a:r>
                         <a:rPr lang="de-CH" sz="4000" dirty="0" err="1" smtClean="0">
@@ -6194,17 +6272,8 @@
                         <a:rPr lang="de-CH" sz="4000" dirty="0" smtClean="0">
                           <a:latin typeface="Calibri" pitchFamily="34" charset="0"/>
                         </a:rPr>
-                        <a:t>Fehler </a:t>
+                        <a:t>Fehler auf Karte anzeigen und verbessern</a:t>
                       </a:r>
-                      <a:r>
-                        <a:rPr lang="de-CH" sz="4000" dirty="0" smtClean="0">
-                          <a:latin typeface="Calibri" pitchFamily="34" charset="0"/>
-                        </a:rPr>
-                        <a:t>auf Karte anzeigen und verbessern</a:t>
-                      </a:r>
-                      <a:endParaRPr lang="de-CH" sz="4000" dirty="0" smtClean="0">
-                        <a:latin typeface="Calibri" pitchFamily="34" charset="0"/>
-                      </a:endParaRPr>
                     </a:p>
                     <a:p>
                       <a:pPr marL="571500" indent="-571500">
@@ -6218,13 +6287,7 @@
                         <a:rPr lang="de-CH" sz="4000" baseline="0" dirty="0" smtClean="0">
                           <a:latin typeface="Calibri" pitchFamily="34" charset="0"/>
                         </a:rPr>
-                        <a:t>Eingetragene Lösungen </a:t>
-                      </a:r>
-                      <a:r>
-                        <a:rPr lang="de-CH" sz="4000" baseline="0" dirty="0" smtClean="0">
-                          <a:latin typeface="Calibri" pitchFamily="34" charset="0"/>
-                        </a:rPr>
-                        <a:t>überprüfen</a:t>
+                        <a:t>Eingetragene Lösungen überprüfen</a:t>
                       </a:r>
                     </a:p>
                     <a:p>
@@ -6251,7 +6314,7 @@
                         <a:rPr lang="de-CH" sz="4000" baseline="0" dirty="0" smtClean="0">
                           <a:latin typeface="Calibri" pitchFamily="34" charset="0"/>
                         </a:rPr>
-                        <a:t> für den Vergleich mit anderen Spielern</a:t>
+                        <a:t> zum Vergleich mit anderen Spielern</a:t>
                       </a:r>
                       <a:endParaRPr lang="de-CH" sz="4000" baseline="0" dirty="0" smtClean="0">
                         <a:latin typeface="Calibri" pitchFamily="34" charset="0"/>
@@ -6292,14 +6355,14 @@
           <p:nvPr>
             <p:extLst>
               <p:ext uri="{D42A27DB-BD31-4B8C-83A1-F6EECF244321}">
-                <p14:modId xmlns:p14="http://schemas.microsoft.com/office/powerpoint/2010/main" val="1937064408"/>
+                <p14:modId xmlns:p14="http://schemas.microsoft.com/office/powerpoint/2010/main" val="3278628765"/>
               </p:ext>
             </p:extLst>
           </p:nvPr>
         </p:nvGraphicFramePr>
         <p:xfrm>
-          <a:off x="1530350" y="18678227"/>
-          <a:ext cx="13897083" cy="10016400"/>
+          <a:off x="1529502" y="18443258"/>
+          <a:ext cx="13897083" cy="10626000"/>
         </p:xfrm>
         <a:graphic>
           <a:graphicData uri="http://schemas.openxmlformats.org/drawingml/2006/table">
@@ -6366,24 +6429,11 @@
                         </a:rPr>
                         <a:t>?</a:t>
                       </a:r>
-                      <a:endParaRPr lang="de-CH" sz="5000" dirty="0" smtClean="0">
-                        <a:effectLst>
-                          <a:outerShdw blurRad="50800" dist="38100" dir="2700000" algn="tl" rotWithShape="0">
-                            <a:prstClr val="black">
-                              <a:alpha val="40000"/>
-                            </a:prstClr>
-                          </a:outerShdw>
-                        </a:effectLst>
-                        <a:latin typeface="Calibri" pitchFamily="34" charset="0"/>
-                        <a:cs typeface="Calibri" pitchFamily="34" charset="0"/>
-                      </a:endParaRPr>
                     </a:p>
                   </a:txBody>
                   <a:tcPr marL="360000" marR="360000" marT="180000" marB="180000">
                     <a:solidFill>
-                      <a:schemeClr val="accent1">
-                        <a:lumMod val="50000"/>
-                      </a:schemeClr>
+                      <a:srgbClr val="035917"/>
                     </a:solidFill>
                   </a:tcPr>
                 </a:tc>
@@ -6417,8 +6467,17 @@
                         <a:rPr lang="de-CH" sz="4000" baseline="0" dirty="0" smtClean="0">
                           <a:latin typeface="Calibri" pitchFamily="34" charset="0"/>
                         </a:rPr>
-                        <a:t> versteht man das Hinzufügen von spieltypischen Elementen in einen nicht-spieltypischen Kontext. Dadurch soll die Motivation der Benutzer erhöht werden.</a:t>
+                        <a:t> versteht man das Hinzufügen von spieltypischen Elementen in einen nicht-spieltypischen Kontext. Dadurch soll die Motivation der Benutzer erhöht </a:t>
                       </a:r>
+                      <a:r>
+                        <a:rPr lang="de-CH" sz="4000" baseline="0" dirty="0" smtClean="0">
+                          <a:latin typeface="Calibri" pitchFamily="34" charset="0"/>
+                        </a:rPr>
+                        <a:t>werden die App längerfristig zu verwenden.</a:t>
+                      </a:r>
+                      <a:endParaRPr lang="de-CH" sz="4000" baseline="0" dirty="0" smtClean="0">
+                        <a:latin typeface="Calibri" pitchFamily="34" charset="0"/>
+                      </a:endParaRPr>
                     </a:p>
                     <a:p>
                       <a:pPr marL="0" indent="0">
@@ -6453,11 +6512,20 @@
                         <a:t>Badges</a:t>
                       </a:r>
                       <a:r>
+                        <a:rPr lang="de-CH" sz="4000" baseline="0" dirty="0" smtClean="0">
+                          <a:latin typeface="Calibri" pitchFamily="34" charset="0"/>
+                        </a:rPr>
+                        <a:t> / </a:t>
+                      </a:r>
+                      <a:r>
                         <a:rPr lang="de-CH" sz="4000" dirty="0" smtClean="0">
                           <a:latin typeface="Calibri" pitchFamily="34" charset="0"/>
                         </a:rPr>
-                        <a:t>/Auszeichnungen</a:t>
+                        <a:t>Auszeichnungen</a:t>
                       </a:r>
+                      <a:endParaRPr lang="de-CH" sz="4000" dirty="0" smtClean="0">
+                        <a:latin typeface="Calibri" pitchFamily="34" charset="0"/>
+                      </a:endParaRPr>
                     </a:p>
                     <a:p>
                       <a:pPr marL="571500" indent="-571500">
@@ -6553,7 +6621,11 @@
                       </a:r>
                     </a:p>
                   </a:txBody>
-                  <a:tcPr marL="360000" marR="360000" marT="180000" marB="180000"/>
+                  <a:tcPr marL="360000" marR="360000" marT="180000" marB="180000">
+                    <a:solidFill>
+                      <a:srgbClr val="C9E7A7"/>
+                    </a:solidFill>
+                  </a:tcPr>
                 </a:tc>
               </a:tr>
             </a:tbl>
@@ -6622,7 +6694,7 @@
         </p:blipFill>
         <p:spPr bwMode="auto">
           <a:xfrm>
-            <a:off x="13857082" y="18327366"/>
+            <a:off x="13856234" y="18092397"/>
             <a:ext cx="1930400" cy="1368190"/>
           </a:xfrm>
           <a:prstGeom prst="rect">
@@ -6663,7 +6735,7 @@
         </p:blipFill>
         <p:spPr bwMode="auto">
           <a:xfrm>
-            <a:off x="13934080" y="11371535"/>
+            <a:off x="13934080" y="11103666"/>
             <a:ext cx="1853402" cy="1732001"/>
           </a:xfrm>
           <a:prstGeom prst="rect">
@@ -6768,7 +6840,7 @@
         </p:blipFill>
         <p:spPr bwMode="auto">
           <a:xfrm>
-            <a:off x="34502693" y="20684757"/>
+            <a:off x="34502693" y="21166007"/>
             <a:ext cx="2690575" cy="742920"/>
           </a:xfrm>
           <a:prstGeom prst="rect">
@@ -6832,7 +6904,7 @@
         </p:blipFill>
         <p:spPr bwMode="auto">
           <a:xfrm>
-            <a:off x="35999591" y="22353934"/>
+            <a:off x="35999591" y="22496249"/>
             <a:ext cx="2832916" cy="780868"/>
           </a:xfrm>
           <a:prstGeom prst="rect">
@@ -6896,7 +6968,7 @@
         </p:blipFill>
         <p:spPr bwMode="auto">
           <a:xfrm>
-            <a:off x="30136880" y="20744838"/>
+            <a:off x="30136880" y="21023311"/>
             <a:ext cx="1657579" cy="1389686"/>
           </a:xfrm>
           <a:prstGeom prst="rect">
@@ -7001,7 +7073,7 @@
         </p:blipFill>
         <p:spPr bwMode="auto">
           <a:xfrm>
-            <a:off x="38360558" y="20804910"/>
+            <a:off x="38360558" y="20996161"/>
             <a:ext cx="1668609" cy="1056786"/>
           </a:xfrm>
           <a:prstGeom prst="rect">
@@ -7196,7 +7268,7 @@
         </p:nvSpPr>
         <p:spPr>
           <a:xfrm>
-            <a:off x="33576926" y="18581212"/>
+            <a:off x="33576926" y="18998922"/>
             <a:ext cx="1734188" cy="461665"/>
           </a:xfrm>
           <a:prstGeom prst="rect">
@@ -7242,7 +7314,7 @@
         </p:blipFill>
         <p:spPr bwMode="auto">
           <a:xfrm>
-            <a:off x="16478021" y="13739110"/>
+            <a:off x="16478021" y="13883130"/>
             <a:ext cx="12775331" cy="14650717"/>
           </a:xfrm>
           <a:prstGeom prst="rect">
@@ -7309,7 +7381,7 @@
         </p:nvSpPr>
         <p:spPr>
           <a:xfrm>
-            <a:off x="29685412" y="19748627"/>
+            <a:off x="29685412" y="20120891"/>
             <a:ext cx="5066063" cy="707886"/>
           </a:xfrm>
           <a:prstGeom prst="rect">
@@ -7343,7 +7415,7 @@
         </p:nvSpPr>
         <p:spPr>
           <a:xfrm>
-            <a:off x="30597722" y="18581211"/>
+            <a:off x="30597722" y="18998921"/>
             <a:ext cx="1734189" cy="461665"/>
           </a:xfrm>
           <a:prstGeom prst="rect">
@@ -7389,7 +7461,7 @@
         </p:blipFill>
         <p:spPr bwMode="auto">
           <a:xfrm>
-            <a:off x="30219803" y="13361388"/>
+            <a:off x="30219803" y="13779098"/>
             <a:ext cx="2490029" cy="5039191"/>
           </a:xfrm>
           <a:prstGeom prst="rect">

</xml_diff>